<commit_message>
thêm references vào slide
</commit_message>
<xml_diff>
--- a/HW#1_Nhom - KDL/Cường/PowerPoint Presentation.pptx
+++ b/HW#1_Nhom - KDL/Cường/PowerPoint Presentation.pptx
@@ -16,6 +16,7 @@
     <p:sldId id="262" r:id="rId10"/>
     <p:sldId id="265" r:id="rId11"/>
     <p:sldId id="263" r:id="rId12"/>
+    <p:sldId id="267" r:id="rId13"/>
   </p:sldIdLst>
   <p:sldSz cx="12192000" cy="6858000"/>
   <p:notesSz cx="6858000" cy="9144000"/>
@@ -6158,6 +6159,876 @@
 </p:sld>
 </file>
 
+<file path=ppt/slides/slide12.xml><?xml version="1.0" encoding="utf-8"?>
+<p:sld xmlns:a="http://schemas.openxmlformats.org/drawingml/2006/main" xmlns:r="http://schemas.openxmlformats.org/officeDocument/2006/relationships" xmlns:p="http://schemas.openxmlformats.org/presentationml/2006/main">
+  <p:cSld>
+    <p:spTree>
+      <p:nvGrpSpPr>
+        <p:cNvPr id="1" name=""/>
+        <p:cNvGrpSpPr/>
+        <p:nvPr/>
+      </p:nvGrpSpPr>
+      <p:grpSpPr>
+        <a:xfrm>
+          <a:off x="0" y="0"/>
+          <a:ext cx="0" cy="0"/>
+          <a:chOff x="0" y="0"/>
+          <a:chExt cx="0" cy="0"/>
+        </a:xfrm>
+      </p:grpSpPr>
+      <p:sp>
+        <p:nvSpPr>
+          <p:cNvPr id="2" name="Rectangle 1">
+            <a:extLst>
+              <a:ext uri="{FF2B5EF4-FFF2-40B4-BE49-F238E27FC236}">
+                <a16:creationId xmlns:a16="http://schemas.microsoft.com/office/drawing/2014/main" id="{1D42E555-756E-42B7-9E6C-0173229FAA73}"/>
+              </a:ext>
+            </a:extLst>
+          </p:cNvPr>
+          <p:cNvSpPr/>
+          <p:nvPr/>
+        </p:nvSpPr>
+        <p:spPr>
+          <a:xfrm>
+            <a:off x="1" y="0"/>
+            <a:ext cx="914399" cy="6858000"/>
+          </a:xfrm>
+          <a:prstGeom prst="rect">
+            <a:avLst/>
+          </a:prstGeom>
+          <a:solidFill>
+            <a:srgbClr val="FEAE1F"/>
+          </a:solidFill>
+          <a:ln>
+            <a:noFill/>
+          </a:ln>
+        </p:spPr>
+        <p:style>
+          <a:lnRef idx="2">
+            <a:schemeClr val="accent6"/>
+          </a:lnRef>
+          <a:fillRef idx="1">
+            <a:schemeClr val="lt1"/>
+          </a:fillRef>
+          <a:effectRef idx="0">
+            <a:schemeClr val="accent6"/>
+          </a:effectRef>
+          <a:fontRef idx="minor">
+            <a:schemeClr val="dk1"/>
+          </a:fontRef>
+        </p:style>
+        <p:txBody>
+          <a:bodyPr rtlCol="0" anchor="ctr"/>
+          <a:lstStyle/>
+          <a:p>
+            <a:pPr algn="ctr"/>
+            <a:endParaRPr lang="en-GB"/>
+          </a:p>
+        </p:txBody>
+      </p:sp>
+      <p:sp>
+        <p:nvSpPr>
+          <p:cNvPr id="3" name="Rectangle 2">
+            <a:extLst>
+              <a:ext uri="{FF2B5EF4-FFF2-40B4-BE49-F238E27FC236}">
+                <a16:creationId xmlns:a16="http://schemas.microsoft.com/office/drawing/2014/main" id="{2BF35773-5832-4296-B03C-252130638DC7}"/>
+              </a:ext>
+            </a:extLst>
+          </p:cNvPr>
+          <p:cNvSpPr/>
+          <p:nvPr/>
+        </p:nvSpPr>
+        <p:spPr>
+          <a:xfrm>
+            <a:off x="457200" y="574137"/>
+            <a:ext cx="7586870" cy="833874"/>
+          </a:xfrm>
+          <a:prstGeom prst="rect">
+            <a:avLst/>
+          </a:prstGeom>
+          <a:solidFill>
+            <a:srgbClr val="262B37"/>
+          </a:solidFill>
+          <a:ln>
+            <a:noFill/>
+          </a:ln>
+        </p:spPr>
+        <p:style>
+          <a:lnRef idx="2">
+            <a:schemeClr val="accent6"/>
+          </a:lnRef>
+          <a:fillRef idx="1">
+            <a:schemeClr val="lt1"/>
+          </a:fillRef>
+          <a:effectRef idx="0">
+            <a:schemeClr val="accent6"/>
+          </a:effectRef>
+          <a:fontRef idx="minor">
+            <a:schemeClr val="dk1"/>
+          </a:fontRef>
+        </p:style>
+        <p:txBody>
+          <a:bodyPr rtlCol="0" anchor="ctr"/>
+          <a:lstStyle/>
+          <a:p>
+            <a:pPr algn="ctr"/>
+            <a:endParaRPr lang="en-GB" dirty="0"/>
+          </a:p>
+        </p:txBody>
+      </p:sp>
+      <p:sp>
+        <p:nvSpPr>
+          <p:cNvPr id="4" name="Rectangle 3">
+            <a:extLst>
+              <a:ext uri="{FF2B5EF4-FFF2-40B4-BE49-F238E27FC236}">
+                <a16:creationId xmlns:a16="http://schemas.microsoft.com/office/drawing/2014/main" id="{617D35BE-C27E-40A4-857B-361EE8D877E5}"/>
+              </a:ext>
+            </a:extLst>
+          </p:cNvPr>
+          <p:cNvSpPr/>
+          <p:nvPr/>
+        </p:nvSpPr>
+        <p:spPr>
+          <a:xfrm>
+            <a:off x="0" y="579760"/>
+            <a:ext cx="278296" cy="165661"/>
+          </a:xfrm>
+          <a:prstGeom prst="rect">
+            <a:avLst/>
+          </a:prstGeom>
+          <a:ln>
+            <a:noFill/>
+          </a:ln>
+        </p:spPr>
+        <p:style>
+          <a:lnRef idx="2">
+            <a:schemeClr val="accent6"/>
+          </a:lnRef>
+          <a:fillRef idx="1">
+            <a:schemeClr val="lt1"/>
+          </a:fillRef>
+          <a:effectRef idx="0">
+            <a:schemeClr val="accent6"/>
+          </a:effectRef>
+          <a:fontRef idx="minor">
+            <a:schemeClr val="dk1"/>
+          </a:fontRef>
+        </p:style>
+        <p:txBody>
+          <a:bodyPr rtlCol="0" anchor="ctr"/>
+          <a:lstStyle/>
+          <a:p>
+            <a:pPr algn="ctr"/>
+            <a:endParaRPr lang="en-GB"/>
+          </a:p>
+        </p:txBody>
+      </p:sp>
+      <p:sp>
+        <p:nvSpPr>
+          <p:cNvPr id="5" name="Rectangle 4">
+            <a:extLst>
+              <a:ext uri="{FF2B5EF4-FFF2-40B4-BE49-F238E27FC236}">
+                <a16:creationId xmlns:a16="http://schemas.microsoft.com/office/drawing/2014/main" id="{D5D83B02-3079-46B9-A40F-24BB4E2CA614}"/>
+              </a:ext>
+            </a:extLst>
+          </p:cNvPr>
+          <p:cNvSpPr/>
+          <p:nvPr/>
+        </p:nvSpPr>
+        <p:spPr>
+          <a:xfrm>
+            <a:off x="0" y="913332"/>
+            <a:ext cx="278296" cy="165661"/>
+          </a:xfrm>
+          <a:prstGeom prst="rect">
+            <a:avLst/>
+          </a:prstGeom>
+          <a:ln>
+            <a:noFill/>
+          </a:ln>
+        </p:spPr>
+        <p:style>
+          <a:lnRef idx="2">
+            <a:schemeClr val="accent6"/>
+          </a:lnRef>
+          <a:fillRef idx="1">
+            <a:schemeClr val="lt1"/>
+          </a:fillRef>
+          <a:effectRef idx="0">
+            <a:schemeClr val="accent6"/>
+          </a:effectRef>
+          <a:fontRef idx="minor">
+            <a:schemeClr val="dk1"/>
+          </a:fontRef>
+        </p:style>
+        <p:txBody>
+          <a:bodyPr rtlCol="0" anchor="ctr"/>
+          <a:lstStyle/>
+          <a:p>
+            <a:pPr algn="ctr"/>
+            <a:endParaRPr lang="en-GB"/>
+          </a:p>
+        </p:txBody>
+      </p:sp>
+      <p:sp>
+        <p:nvSpPr>
+          <p:cNvPr id="6" name="Rectangle 5">
+            <a:extLst>
+              <a:ext uri="{FF2B5EF4-FFF2-40B4-BE49-F238E27FC236}">
+                <a16:creationId xmlns:a16="http://schemas.microsoft.com/office/drawing/2014/main" id="{D8BC9169-0B70-475C-9366-0353E4F10D6B}"/>
+              </a:ext>
+            </a:extLst>
+          </p:cNvPr>
+          <p:cNvSpPr/>
+          <p:nvPr/>
+        </p:nvSpPr>
+        <p:spPr>
+          <a:xfrm>
+            <a:off x="0" y="1242350"/>
+            <a:ext cx="278296" cy="165661"/>
+          </a:xfrm>
+          <a:prstGeom prst="rect">
+            <a:avLst/>
+          </a:prstGeom>
+          <a:ln>
+            <a:noFill/>
+          </a:ln>
+        </p:spPr>
+        <p:style>
+          <a:lnRef idx="2">
+            <a:schemeClr val="accent6"/>
+          </a:lnRef>
+          <a:fillRef idx="1">
+            <a:schemeClr val="lt1"/>
+          </a:fillRef>
+          <a:effectRef idx="0">
+            <a:schemeClr val="accent6"/>
+          </a:effectRef>
+          <a:fontRef idx="minor">
+            <a:schemeClr val="dk1"/>
+          </a:fontRef>
+        </p:style>
+        <p:txBody>
+          <a:bodyPr rtlCol="0" anchor="ctr"/>
+          <a:lstStyle/>
+          <a:p>
+            <a:pPr algn="ctr"/>
+            <a:endParaRPr lang="en-GB"/>
+          </a:p>
+        </p:txBody>
+      </p:sp>
+      <p:sp>
+        <p:nvSpPr>
+          <p:cNvPr id="8" name="Rectangle 7">
+            <a:extLst>
+              <a:ext uri="{FF2B5EF4-FFF2-40B4-BE49-F238E27FC236}">
+                <a16:creationId xmlns:a16="http://schemas.microsoft.com/office/drawing/2014/main" id="{FAAAF4AD-0780-4F1C-8553-9C5E2E3CC025}"/>
+              </a:ext>
+            </a:extLst>
+          </p:cNvPr>
+          <p:cNvSpPr/>
+          <p:nvPr/>
+        </p:nvSpPr>
+        <p:spPr>
+          <a:xfrm>
+            <a:off x="1351720" y="1942391"/>
+            <a:ext cx="238539" cy="257469"/>
+          </a:xfrm>
+          <a:prstGeom prst="rect">
+            <a:avLst/>
+          </a:prstGeom>
+          <a:solidFill>
+            <a:srgbClr val="262B37"/>
+          </a:solidFill>
+          <a:ln>
+            <a:noFill/>
+          </a:ln>
+        </p:spPr>
+        <p:style>
+          <a:lnRef idx="2">
+            <a:schemeClr val="accent6"/>
+          </a:lnRef>
+          <a:fillRef idx="1">
+            <a:schemeClr val="lt1"/>
+          </a:fillRef>
+          <a:effectRef idx="0">
+            <a:schemeClr val="accent6"/>
+          </a:effectRef>
+          <a:fontRef idx="minor">
+            <a:schemeClr val="dk1"/>
+          </a:fontRef>
+        </p:style>
+        <p:txBody>
+          <a:bodyPr rtlCol="0" anchor="ctr"/>
+          <a:lstStyle/>
+          <a:p>
+            <a:pPr algn="ctr"/>
+            <a:endParaRPr lang="en-GB" dirty="0"/>
+          </a:p>
+        </p:txBody>
+      </p:sp>
+      <p:sp>
+        <p:nvSpPr>
+          <p:cNvPr id="9" name="Rectangle 8">
+            <a:extLst>
+              <a:ext uri="{FF2B5EF4-FFF2-40B4-BE49-F238E27FC236}">
+                <a16:creationId xmlns:a16="http://schemas.microsoft.com/office/drawing/2014/main" id="{E3A8D1E9-E18C-452F-9924-D78CEBB9AD8B}"/>
+              </a:ext>
+            </a:extLst>
+          </p:cNvPr>
+          <p:cNvSpPr/>
+          <p:nvPr/>
+        </p:nvSpPr>
+        <p:spPr>
+          <a:xfrm>
+            <a:off x="1351720" y="2734240"/>
+            <a:ext cx="238539" cy="257469"/>
+          </a:xfrm>
+          <a:prstGeom prst="rect">
+            <a:avLst/>
+          </a:prstGeom>
+          <a:solidFill>
+            <a:srgbClr val="262B37"/>
+          </a:solidFill>
+          <a:ln>
+            <a:noFill/>
+          </a:ln>
+        </p:spPr>
+        <p:style>
+          <a:lnRef idx="2">
+            <a:schemeClr val="accent6"/>
+          </a:lnRef>
+          <a:fillRef idx="1">
+            <a:schemeClr val="lt1"/>
+          </a:fillRef>
+          <a:effectRef idx="0">
+            <a:schemeClr val="accent6"/>
+          </a:effectRef>
+          <a:fontRef idx="minor">
+            <a:schemeClr val="dk1"/>
+          </a:fontRef>
+        </p:style>
+        <p:txBody>
+          <a:bodyPr rtlCol="0" anchor="ctr"/>
+          <a:lstStyle/>
+          <a:p>
+            <a:pPr algn="ctr"/>
+            <a:endParaRPr lang="en-GB" dirty="0"/>
+          </a:p>
+        </p:txBody>
+      </p:sp>
+      <p:sp>
+        <p:nvSpPr>
+          <p:cNvPr id="10" name="Rectangle 9">
+            <a:extLst>
+              <a:ext uri="{FF2B5EF4-FFF2-40B4-BE49-F238E27FC236}">
+                <a16:creationId xmlns:a16="http://schemas.microsoft.com/office/drawing/2014/main" id="{A9574A33-FA7E-43E4-B0F4-1F5C9833DE1A}"/>
+              </a:ext>
+            </a:extLst>
+          </p:cNvPr>
+          <p:cNvSpPr/>
+          <p:nvPr/>
+        </p:nvSpPr>
+        <p:spPr>
+          <a:xfrm>
+            <a:off x="1351719" y="3526089"/>
+            <a:ext cx="238539" cy="257469"/>
+          </a:xfrm>
+          <a:prstGeom prst="rect">
+            <a:avLst/>
+          </a:prstGeom>
+          <a:solidFill>
+            <a:srgbClr val="262B37"/>
+          </a:solidFill>
+          <a:ln>
+            <a:noFill/>
+          </a:ln>
+        </p:spPr>
+        <p:style>
+          <a:lnRef idx="2">
+            <a:schemeClr val="accent6"/>
+          </a:lnRef>
+          <a:fillRef idx="1">
+            <a:schemeClr val="lt1"/>
+          </a:fillRef>
+          <a:effectRef idx="0">
+            <a:schemeClr val="accent6"/>
+          </a:effectRef>
+          <a:fontRef idx="minor">
+            <a:schemeClr val="dk1"/>
+          </a:fontRef>
+        </p:style>
+        <p:txBody>
+          <a:bodyPr rtlCol="0" anchor="ctr"/>
+          <a:lstStyle/>
+          <a:p>
+            <a:pPr algn="ctr"/>
+            <a:endParaRPr lang="en-GB" dirty="0"/>
+          </a:p>
+        </p:txBody>
+      </p:sp>
+      <p:sp>
+        <p:nvSpPr>
+          <p:cNvPr id="12" name="Rectangle 11">
+            <a:extLst>
+              <a:ext uri="{FF2B5EF4-FFF2-40B4-BE49-F238E27FC236}">
+                <a16:creationId xmlns:a16="http://schemas.microsoft.com/office/drawing/2014/main" id="{B1A87F49-2A66-4EFE-A467-C1D52068C701}"/>
+              </a:ext>
+            </a:extLst>
+          </p:cNvPr>
+          <p:cNvSpPr/>
+          <p:nvPr/>
+        </p:nvSpPr>
+        <p:spPr>
+          <a:xfrm>
+            <a:off x="816295" y="443255"/>
+            <a:ext cx="10559410" cy="1095638"/>
+          </a:xfrm>
+          <a:prstGeom prst="rect">
+            <a:avLst/>
+          </a:prstGeom>
+          <a:noFill/>
+          <a:ln>
+            <a:noFill/>
+          </a:ln>
+        </p:spPr>
+        <p:style>
+          <a:lnRef idx="2">
+            <a:schemeClr val="accent1">
+              <a:shade val="50000"/>
+            </a:schemeClr>
+          </a:lnRef>
+          <a:fillRef idx="1">
+            <a:schemeClr val="accent1"/>
+          </a:fillRef>
+          <a:effectRef idx="0">
+            <a:schemeClr val="accent1"/>
+          </a:effectRef>
+          <a:fontRef idx="minor">
+            <a:schemeClr val="lt1"/>
+          </a:fontRef>
+        </p:style>
+        <p:txBody>
+          <a:bodyPr rtlCol="0" anchor="ctr"/>
+          <a:lstStyle/>
+          <a:p>
+            <a:r>
+              <a:rPr lang="vi-VN" sz="3200" dirty="0" err="1">
+                <a:solidFill>
+                  <a:srgbClr val="E4E6EB"/>
+                </a:solidFill>
+              </a:rPr>
+              <a:t>References</a:t>
+            </a:r>
+            <a:endParaRPr lang="en-GB" sz="3200" dirty="0"/>
+          </a:p>
+        </p:txBody>
+      </p:sp>
+      <p:sp>
+        <p:nvSpPr>
+          <p:cNvPr id="16" name="Rectangle 15">
+            <a:extLst>
+              <a:ext uri="{FF2B5EF4-FFF2-40B4-BE49-F238E27FC236}">
+                <a16:creationId xmlns:a16="http://schemas.microsoft.com/office/drawing/2014/main" id="{026CC253-BF18-4E8D-BD8C-83C6B152CC4D}"/>
+              </a:ext>
+            </a:extLst>
+          </p:cNvPr>
+          <p:cNvSpPr/>
+          <p:nvPr/>
+        </p:nvSpPr>
+        <p:spPr>
+          <a:xfrm>
+            <a:off x="1881806" y="1738015"/>
+            <a:ext cx="9689911" cy="666220"/>
+          </a:xfrm>
+          <a:prstGeom prst="rect">
+            <a:avLst/>
+          </a:prstGeom>
+          <a:noFill/>
+          <a:ln>
+            <a:noFill/>
+          </a:ln>
+        </p:spPr>
+        <p:style>
+          <a:lnRef idx="2">
+            <a:schemeClr val="accent1">
+              <a:shade val="50000"/>
+            </a:schemeClr>
+          </a:lnRef>
+          <a:fillRef idx="1">
+            <a:schemeClr val="accent1"/>
+          </a:fillRef>
+          <a:effectRef idx="0">
+            <a:schemeClr val="accent1"/>
+          </a:effectRef>
+          <a:fontRef idx="minor">
+            <a:schemeClr val="lt1"/>
+          </a:fontRef>
+        </p:style>
+        <p:txBody>
+          <a:bodyPr rtlCol="0" anchor="ctr"/>
+          <a:lstStyle/>
+          <a:p>
+            <a:pPr marL="0" marR="0">
+              <a:spcBef>
+                <a:spcPts val="0"/>
+              </a:spcBef>
+              <a:spcAft>
+                <a:spcPts val="0"/>
+              </a:spcAft>
+            </a:pPr>
+            <a:r>
+              <a:rPr lang="en-GB" sz="2800" dirty="0">
+                <a:solidFill>
+                  <a:srgbClr val="262B37"/>
+                </a:solidFill>
+                <a:effectLst/>
+                <a:ea typeface="Calibri" panose="020F0502020204030204" pitchFamily="34" charset="0"/>
+                <a:cs typeface="Times New Roman" panose="02020603050405020304" pitchFamily="18" charset="0"/>
+              </a:rPr>
+              <a:t>http://www.geekinterview.com/question_details/35430</a:t>
+            </a:r>
+          </a:p>
+        </p:txBody>
+      </p:sp>
+      <p:sp>
+        <p:nvSpPr>
+          <p:cNvPr id="17" name="Rectangle 16">
+            <a:extLst>
+              <a:ext uri="{FF2B5EF4-FFF2-40B4-BE49-F238E27FC236}">
+                <a16:creationId xmlns:a16="http://schemas.microsoft.com/office/drawing/2014/main" id="{0608DABA-79FE-4F78-86E4-EF3766975994}"/>
+              </a:ext>
+            </a:extLst>
+          </p:cNvPr>
+          <p:cNvSpPr/>
+          <p:nvPr/>
+        </p:nvSpPr>
+        <p:spPr>
+          <a:xfrm>
+            <a:off x="1881805" y="2529864"/>
+            <a:ext cx="9689911" cy="666220"/>
+          </a:xfrm>
+          <a:prstGeom prst="rect">
+            <a:avLst/>
+          </a:prstGeom>
+          <a:noFill/>
+          <a:ln>
+            <a:noFill/>
+          </a:ln>
+        </p:spPr>
+        <p:style>
+          <a:lnRef idx="2">
+            <a:schemeClr val="accent1">
+              <a:shade val="50000"/>
+            </a:schemeClr>
+          </a:lnRef>
+          <a:fillRef idx="1">
+            <a:schemeClr val="accent1"/>
+          </a:fillRef>
+          <a:effectRef idx="0">
+            <a:schemeClr val="accent1"/>
+          </a:effectRef>
+          <a:fontRef idx="minor">
+            <a:schemeClr val="lt1"/>
+          </a:fontRef>
+        </p:style>
+        <p:txBody>
+          <a:bodyPr rtlCol="0" anchor="ctr"/>
+          <a:lstStyle/>
+          <a:p>
+            <a:pPr marL="0" marR="0">
+              <a:spcBef>
+                <a:spcPts val="0"/>
+              </a:spcBef>
+              <a:spcAft>
+                <a:spcPts val="0"/>
+              </a:spcAft>
+            </a:pPr>
+            <a:endParaRPr lang="en-GB" sz="2800" dirty="0">
+              <a:solidFill>
+                <a:srgbClr val="262B37"/>
+              </a:solidFill>
+              <a:effectLst/>
+              <a:ea typeface="Calibri" panose="020F0502020204030204" pitchFamily="34" charset="0"/>
+              <a:cs typeface="Times New Roman" panose="02020603050405020304" pitchFamily="18" charset="0"/>
+            </a:endParaRPr>
+          </a:p>
+        </p:txBody>
+      </p:sp>
+      <p:sp>
+        <p:nvSpPr>
+          <p:cNvPr id="18" name="Rectangle 17">
+            <a:extLst>
+              <a:ext uri="{FF2B5EF4-FFF2-40B4-BE49-F238E27FC236}">
+                <a16:creationId xmlns:a16="http://schemas.microsoft.com/office/drawing/2014/main" id="{D22C87DD-278D-42B7-861A-C0A26706EE0B}"/>
+              </a:ext>
+            </a:extLst>
+          </p:cNvPr>
+          <p:cNvSpPr/>
+          <p:nvPr/>
+        </p:nvSpPr>
+        <p:spPr>
+          <a:xfrm>
+            <a:off x="1881804" y="3321713"/>
+            <a:ext cx="9689911" cy="666220"/>
+          </a:xfrm>
+          <a:prstGeom prst="rect">
+            <a:avLst/>
+          </a:prstGeom>
+          <a:noFill/>
+          <a:ln>
+            <a:noFill/>
+          </a:ln>
+        </p:spPr>
+        <p:style>
+          <a:lnRef idx="2">
+            <a:schemeClr val="accent1">
+              <a:shade val="50000"/>
+            </a:schemeClr>
+          </a:lnRef>
+          <a:fillRef idx="1">
+            <a:schemeClr val="accent1"/>
+          </a:fillRef>
+          <a:effectRef idx="0">
+            <a:schemeClr val="accent1"/>
+          </a:effectRef>
+          <a:fontRef idx="minor">
+            <a:schemeClr val="lt1"/>
+          </a:fontRef>
+        </p:style>
+        <p:txBody>
+          <a:bodyPr rtlCol="0" anchor="ctr"/>
+          <a:lstStyle/>
+          <a:p>
+            <a:pPr marL="0" marR="0">
+              <a:spcBef>
+                <a:spcPts val="0"/>
+              </a:spcBef>
+              <a:spcAft>
+                <a:spcPts val="0"/>
+              </a:spcAft>
+            </a:pPr>
+            <a:r>
+              <a:rPr lang="vi-VN" sz="2800" dirty="0">
+                <a:solidFill>
+                  <a:srgbClr val="262B37"/>
+                </a:solidFill>
+                <a:effectLst/>
+                <a:latin typeface="Arial" panose="020B0604020202020204" pitchFamily="34" charset="0"/>
+                <a:ea typeface="Arial" panose="020B0604020202020204" pitchFamily="34" charset="0"/>
+              </a:rPr>
+              <a:t>https://o7planning.org/10355/what-is-business-intelligence</a:t>
+            </a:r>
+            <a:endParaRPr lang="en-GB" sz="2800" dirty="0">
+              <a:solidFill>
+                <a:srgbClr val="262B37"/>
+              </a:solidFill>
+              <a:effectLst/>
+              <a:ea typeface="Calibri" panose="020F0502020204030204" pitchFamily="34" charset="0"/>
+              <a:cs typeface="Times New Roman" panose="02020603050405020304" pitchFamily="18" charset="0"/>
+            </a:endParaRPr>
+          </a:p>
+        </p:txBody>
+      </p:sp>
+      <p:sp>
+        <p:nvSpPr>
+          <p:cNvPr id="19" name="TextBox 18">
+            <a:extLst>
+              <a:ext uri="{FF2B5EF4-FFF2-40B4-BE49-F238E27FC236}">
+                <a16:creationId xmlns:a16="http://schemas.microsoft.com/office/drawing/2014/main" id="{67EF97C4-EC45-4021-8ABB-D6C35D53BB92}"/>
+              </a:ext>
+            </a:extLst>
+          </p:cNvPr>
+          <p:cNvSpPr txBox="1"/>
+          <p:nvPr/>
+        </p:nvSpPr>
+        <p:spPr>
+          <a:xfrm>
+            <a:off x="1755213" y="2601364"/>
+            <a:ext cx="9943092" cy="523220"/>
+          </a:xfrm>
+          <a:prstGeom prst="rect">
+            <a:avLst/>
+          </a:prstGeom>
+          <a:noFill/>
+        </p:spPr>
+        <p:txBody>
+          <a:bodyPr wrap="square">
+            <a:spAutoFit/>
+          </a:bodyPr>
+          <a:lstStyle/>
+          <a:p>
+            <a:r>
+              <a:rPr lang="en-GB" sz="2800" dirty="0">
+                <a:solidFill>
+                  <a:srgbClr val="262B37"/>
+                </a:solidFill>
+                <a:effectLst/>
+                <a:latin typeface="Arial" panose="020B0604020202020204" pitchFamily="34" charset="0"/>
+                <a:ea typeface="Calibri" panose="020F0502020204030204" pitchFamily="34" charset="0"/>
+                <a:cs typeface="Arial" panose="020B0604020202020204" pitchFamily="34" charset="0"/>
+              </a:rPr>
+              <a:t> </a:t>
+            </a:r>
+            <a:r>
+              <a:rPr lang="vi-VN" sz="2800" dirty="0">
+                <a:solidFill>
+                  <a:srgbClr val="262B37"/>
+                </a:solidFill>
+                <a:effectLst/>
+                <a:latin typeface="Arial" panose="020B0604020202020204" pitchFamily="34" charset="0"/>
+                <a:ea typeface="Calibri" panose="020F0502020204030204" pitchFamily="34" charset="0"/>
+                <a:cs typeface="Arial" panose="020B0604020202020204" pitchFamily="34" charset="0"/>
+                <a:hlinkClick r:id="rId2">
+                  <a:extLst>
+                    <a:ext uri="{A12FA001-AC4F-418D-AE19-62706E023703}">
+                      <ahyp:hlinkClr xmlns:ahyp="http://schemas.microsoft.com/office/drawing/2018/hyperlinkcolor" val="tx"/>
+                    </a:ext>
+                  </a:extLst>
+                </a:hlinkClick>
+              </a:rPr>
+              <a:t>https://www.guru99.com/data-warehouse-architecture.html</a:t>
+            </a:r>
+            <a:endParaRPr lang="en-GB" sz="2800" dirty="0">
+              <a:solidFill>
+                <a:srgbClr val="262B37"/>
+              </a:solidFill>
+              <a:latin typeface="Arial" panose="020B0604020202020204" pitchFamily="34" charset="0"/>
+              <a:cs typeface="Arial" panose="020B0604020202020204" pitchFamily="34" charset="0"/>
+            </a:endParaRPr>
+          </a:p>
+        </p:txBody>
+      </p:sp>
+      <p:sp>
+        <p:nvSpPr>
+          <p:cNvPr id="21" name="Rectangle 20">
+            <a:extLst>
+              <a:ext uri="{FF2B5EF4-FFF2-40B4-BE49-F238E27FC236}">
+                <a16:creationId xmlns:a16="http://schemas.microsoft.com/office/drawing/2014/main" id="{6A6E61DB-B0EE-4228-8F17-CC938EC3EB81}"/>
+              </a:ext>
+            </a:extLst>
+          </p:cNvPr>
+          <p:cNvSpPr/>
+          <p:nvPr/>
+        </p:nvSpPr>
+        <p:spPr>
+          <a:xfrm>
+            <a:off x="1351719" y="4389438"/>
+            <a:ext cx="238539" cy="257469"/>
+          </a:xfrm>
+          <a:prstGeom prst="rect">
+            <a:avLst/>
+          </a:prstGeom>
+          <a:solidFill>
+            <a:srgbClr val="262B37"/>
+          </a:solidFill>
+          <a:ln>
+            <a:noFill/>
+          </a:ln>
+        </p:spPr>
+        <p:style>
+          <a:lnRef idx="2">
+            <a:schemeClr val="accent6"/>
+          </a:lnRef>
+          <a:fillRef idx="1">
+            <a:schemeClr val="lt1"/>
+          </a:fillRef>
+          <a:effectRef idx="0">
+            <a:schemeClr val="accent6"/>
+          </a:effectRef>
+          <a:fontRef idx="minor">
+            <a:schemeClr val="dk1"/>
+          </a:fontRef>
+        </p:style>
+        <p:txBody>
+          <a:bodyPr rtlCol="0" anchor="ctr"/>
+          <a:lstStyle/>
+          <a:p>
+            <a:pPr algn="ctr"/>
+            <a:endParaRPr lang="en-GB" dirty="0"/>
+          </a:p>
+        </p:txBody>
+      </p:sp>
+      <p:sp>
+        <p:nvSpPr>
+          <p:cNvPr id="22" name="Rectangle 21">
+            <a:extLst>
+              <a:ext uri="{FF2B5EF4-FFF2-40B4-BE49-F238E27FC236}">
+                <a16:creationId xmlns:a16="http://schemas.microsoft.com/office/drawing/2014/main" id="{3CEF0ABD-97C5-4DA9-8127-EA880ABB17E8}"/>
+              </a:ext>
+            </a:extLst>
+          </p:cNvPr>
+          <p:cNvSpPr/>
+          <p:nvPr/>
+        </p:nvSpPr>
+        <p:spPr>
+          <a:xfrm>
+            <a:off x="1881803" y="4185062"/>
+            <a:ext cx="9689911" cy="666221"/>
+          </a:xfrm>
+          <a:prstGeom prst="rect">
+            <a:avLst/>
+          </a:prstGeom>
+          <a:noFill/>
+          <a:ln>
+            <a:noFill/>
+          </a:ln>
+        </p:spPr>
+        <p:style>
+          <a:lnRef idx="2">
+            <a:schemeClr val="accent1">
+              <a:shade val="50000"/>
+            </a:schemeClr>
+          </a:lnRef>
+          <a:fillRef idx="1">
+            <a:schemeClr val="accent1"/>
+          </a:fillRef>
+          <a:effectRef idx="0">
+            <a:schemeClr val="accent1"/>
+          </a:effectRef>
+          <a:fontRef idx="minor">
+            <a:schemeClr val="lt1"/>
+          </a:fontRef>
+        </p:style>
+        <p:txBody>
+          <a:bodyPr rtlCol="0" anchor="ctr"/>
+          <a:lstStyle/>
+          <a:p>
+            <a:pPr marL="0" marR="0">
+              <a:spcBef>
+                <a:spcPts val="0"/>
+              </a:spcBef>
+              <a:spcAft>
+                <a:spcPts val="0"/>
+              </a:spcAft>
+            </a:pPr>
+            <a:r>
+              <a:rPr lang="en-GB" sz="2800" dirty="0">
+                <a:solidFill>
+                  <a:srgbClr val="262B37"/>
+                </a:solidFill>
+                <a:effectLst/>
+                <a:ea typeface="Calibri" panose="020F0502020204030204" pitchFamily="34" charset="0"/>
+                <a:cs typeface="Times New Roman" panose="02020603050405020304" pitchFamily="18" charset="0"/>
+              </a:rPr>
+              <a:t>https://www.tutorialspoint.com</a:t>
+            </a:r>
+          </a:p>
+        </p:txBody>
+      </p:sp>
+    </p:spTree>
+    <p:extLst>
+      <p:ext uri="{BB962C8B-B14F-4D97-AF65-F5344CB8AC3E}">
+        <p14:creationId xmlns:p14="http://schemas.microsoft.com/office/powerpoint/2010/main" val="3509762807"/>
+      </p:ext>
+    </p:extLst>
+  </p:cSld>
+  <p:clrMapOvr>
+    <a:masterClrMapping/>
+  </p:clrMapOvr>
+</p:sld>
+</file>
+
 <file path=ppt/slides/slide2.xml><?xml version="1.0" encoding="utf-8"?>
 <p:sld xmlns:a="http://schemas.openxmlformats.org/drawingml/2006/main" xmlns:r="http://schemas.openxmlformats.org/officeDocument/2006/relationships" xmlns:p="http://schemas.openxmlformats.org/presentationml/2006/main">
   <p:cSld>

</xml_diff>

<commit_message>
sửa lỗi chính tả slide
</commit_message>
<xml_diff>
--- a/HW#1_Nhom - KDL/Cường/PowerPoint Presentation.pptx
+++ b/HW#1_Nhom - KDL/Cường/PowerPoint Presentation.pptx
@@ -4305,7 +4305,7 @@
               <a:t> </a:t>
             </a:r>
             <a:r>
-              <a:rPr lang="vi-VN" sz="3200" dirty="0" err="1">
+              <a:rPr lang="vi-VN" sz="3200" err="1">
                 <a:solidFill>
                   <a:srgbClr val="E4E6EB"/>
                 </a:solidFill>
@@ -4313,12 +4313,12 @@
               <a:t>số</a:t>
             </a:r>
             <a:r>
-              <a:rPr lang="vi-VN" sz="3200" dirty="0">
+              <a:rPr lang="vi-VN" sz="3200">
                 <a:solidFill>
                   <a:srgbClr val="E4E6EB"/>
                 </a:solidFill>
               </a:rPr>
-              <a:t> thanh </a:t>
+              <a:t> thành </a:t>
             </a:r>
             <a:r>
               <a:rPr lang="vi-VN" sz="3200" dirty="0" err="1">
@@ -7843,7 +7843,29 @@
                 <a:ea typeface="Calibri" panose="020F0502020204030204" pitchFamily="34" charset="0"/>
                 <a:cs typeface="Times New Roman" panose="02020603050405020304" pitchFamily="18" charset="0"/>
               </a:rPr>
-              <a:t> thô thanh thông tin </a:t>
+              <a:t> thô </a:t>
+            </a:r>
+            <a:r>
+              <a:rPr lang="vi-VN" sz="2800" dirty="0" err="1">
+                <a:solidFill>
+                  <a:srgbClr val="202124"/>
+                </a:solidFill>
+                <a:effectLst/>
+                <a:ea typeface="Calibri" panose="020F0502020204030204" pitchFamily="34" charset="0"/>
+                <a:cs typeface="Times New Roman" panose="02020603050405020304" pitchFamily="18" charset="0"/>
+              </a:rPr>
+              <a:t>thành</a:t>
+            </a:r>
+            <a:r>
+              <a:rPr lang="vi-VN" sz="2800" dirty="0">
+                <a:solidFill>
+                  <a:srgbClr val="202124"/>
+                </a:solidFill>
+                <a:effectLst/>
+                <a:ea typeface="Calibri" panose="020F0502020204030204" pitchFamily="34" charset="0"/>
+                <a:cs typeface="Times New Roman" panose="02020603050405020304" pitchFamily="18" charset="0"/>
+              </a:rPr>
+              <a:t> thông tin </a:t>
             </a:r>
             <a:r>
               <a:rPr lang="vi-VN" sz="2800" dirty="0" err="1">
@@ -16804,7 +16826,23 @@
                   <a:srgbClr val="E4E6EB"/>
                 </a:solidFill>
               </a:rPr>
-              <a:t> thanh </a:t>
+              <a:t> </a:t>
+            </a:r>
+            <a:r>
+              <a:rPr lang="vi-VN" sz="3200" dirty="0" err="1">
+                <a:solidFill>
+                  <a:srgbClr val="E4E6EB"/>
+                </a:solidFill>
+              </a:rPr>
+              <a:t>thành</a:t>
+            </a:r>
+            <a:r>
+              <a:rPr lang="vi-VN" sz="3200" dirty="0">
+                <a:solidFill>
+                  <a:srgbClr val="E4E6EB"/>
+                </a:solidFill>
+              </a:rPr>
+              <a:t> </a:t>
             </a:r>
             <a:r>
               <a:rPr lang="vi-VN" sz="3200" dirty="0" err="1">

</xml_diff>